<commit_message>
presentations and demo web
</commit_message>
<xml_diff>
--- a/prezentace/1. ročník/03 - licence, citace, ochranná známka.pptx
+++ b/prezentace/1. ročník/03 - licence, citace, ochranná známka.pptx
@@ -1057,6 +1057,13 @@
             <a:schemeClr val="lt1"/>
           </a:fontRef>
         </p:style>
+        <p:txBody>
+          <a:bodyPr/>
+          <a:lstStyle/>
+          <a:p>
+            <a:endParaRPr lang="cs-CZ"/>
+          </a:p>
+        </p:txBody>
       </p:sp>
       <p:sp>
         <p:nvSpPr>
@@ -1095,6 +1102,13 @@
             <a:schemeClr val="lt1"/>
           </a:fontRef>
         </p:style>
+        <p:txBody>
+          <a:bodyPr/>
+          <a:lstStyle/>
+          <a:p>
+            <a:endParaRPr lang="cs-CZ"/>
+          </a:p>
+        </p:txBody>
       </p:sp>
       <p:sp>
         <p:nvSpPr>
@@ -1227,7 +1241,7 @@
           <a:p>
             <a:fld id="{4BDF68E2-58F2-4D09-BE8B-E3BD06533059}" type="datetimeFigureOut">
               <a:rPr lang="en-US" dirty="0"/>
-              <a:t>10/12/2025</a:t>
+              <a:t>10/13/2025</a:t>
             </a:fld>
             <a:endParaRPr lang="en-US"/>
           </a:p>
@@ -1433,7 +1447,7 @@
           <a:p>
             <a:fld id="{2E2D6473-DF6D-4702-B328-E0DD40540A4E}" type="datetimeFigureOut">
               <a:rPr lang="en-US" dirty="0"/>
-              <a:t>10/12/2025</a:t>
+              <a:t>10/13/2025</a:t>
             </a:fld>
             <a:endParaRPr lang="en-US"/>
           </a:p>
@@ -1687,7 +1701,7 @@
           <a:p>
             <a:fld id="{E26F7E3A-B166-407D-9866-32884E7D5B37}" type="datetimeFigureOut">
               <a:rPr lang="en-US" dirty="0"/>
-              <a:t>10/12/2025</a:t>
+              <a:t>10/13/2025</a:t>
             </a:fld>
             <a:endParaRPr lang="en-US"/>
           </a:p>
@@ -1859,7 +1873,7 @@
           <a:p>
             <a:fld id="{528FC5F6-F338-4AE4-BB23-26385BCFC423}" type="datetimeFigureOut">
               <a:rPr lang="en-US" dirty="0"/>
-              <a:t>10/12/2025</a:t>
+              <a:t>10/13/2025</a:t>
             </a:fld>
             <a:endParaRPr lang="en-US"/>
           </a:p>
@@ -2201,7 +2215,7 @@
           <a:p>
             <a:fld id="{20EBB0C4-6273-4C6E-B9BD-2EDC30F1CD52}" type="datetimeFigureOut">
               <a:rPr lang="en-US" dirty="0"/>
-              <a:t>10/12/2025</a:t>
+              <a:t>10/13/2025</a:t>
             </a:fld>
             <a:endParaRPr lang="en-US"/>
           </a:p>
@@ -2473,7 +2487,7 @@
           <a:p>
             <a:fld id="{19AB4D41-86C1-4908-B66A-0B50CEB3BF29}" type="datetimeFigureOut">
               <a:rPr lang="en-US" dirty="0"/>
-              <a:t>10/12/2025</a:t>
+              <a:t>10/13/2025</a:t>
             </a:fld>
             <a:endParaRPr lang="en-US"/>
           </a:p>
@@ -2849,7 +2863,7 @@
           <a:p>
             <a:fld id="{E6426E2C-56C1-4E0D-A793-0088A7FDD37E}" type="datetimeFigureOut">
               <a:rPr lang="en-US" dirty="0"/>
-              <a:t>10/12/2025</a:t>
+              <a:t>10/13/2025</a:t>
             </a:fld>
             <a:endParaRPr lang="en-US"/>
           </a:p>
@@ -2966,7 +2980,7 @@
           <a:p>
             <a:fld id="{C8C39B41-D8B5-4052-B551-9B5525EAA8B6}" type="datetimeFigureOut">
               <a:rPr lang="en-US" dirty="0"/>
-              <a:t>10/12/2025</a:t>
+              <a:t>10/13/2025</a:t>
             </a:fld>
             <a:endParaRPr lang="en-US"/>
           </a:p>
@@ -3137,7 +3151,7 @@
           <a:p>
             <a:fld id="{4D94136C-8742-45B2-AF27-D93DF72833A9}" type="datetimeFigureOut">
               <a:rPr lang="en-US" dirty="0"/>
-              <a:t>10/12/2025</a:t>
+              <a:t>10/13/2025</a:t>
             </a:fld>
             <a:endParaRPr lang="en-US"/>
           </a:p>
@@ -3490,7 +3504,7 @@
           <a:p>
             <a:fld id="{32ABBEA6-7C60-4B02-AE87-00D78D8422AF}" type="datetimeFigureOut">
               <a:rPr lang="en-US" dirty="0"/>
-              <a:t>10/12/2025</a:t>
+              <a:t>10/13/2025</a:t>
             </a:fld>
             <a:endParaRPr lang="en-US"/>
           </a:p>
@@ -3868,7 +3882,7 @@
           <a:p>
             <a:fld id="{C9CAD897-D46E-4AD2-BD9B-49DD3E640873}" type="datetimeFigureOut">
               <a:rPr lang="en-US" dirty="0"/>
-              <a:t>10/12/2025</a:t>
+              <a:t>10/13/2025</a:t>
             </a:fld>
             <a:endParaRPr lang="en-US"/>
           </a:p>
@@ -3988,6 +4002,13 @@
             <a:schemeClr val="lt1"/>
           </a:fontRef>
         </p:style>
+        <p:txBody>
+          <a:bodyPr/>
+          <a:lstStyle/>
+          <a:p>
+            <a:endParaRPr lang="cs-CZ"/>
+          </a:p>
+        </p:txBody>
       </p:sp>
       <p:sp>
         <p:nvSpPr>
@@ -4026,6 +4047,13 @@
             <a:schemeClr val="lt1"/>
           </a:fontRef>
         </p:style>
+        <p:txBody>
+          <a:bodyPr/>
+          <a:lstStyle/>
+          <a:p>
+            <a:endParaRPr lang="cs-CZ"/>
+          </a:p>
+        </p:txBody>
       </p:sp>
       <p:sp>
         <p:nvSpPr>
@@ -4153,7 +4181,7 @@
           <a:p>
             <a:fld id="{98624D31-43A5-475A-80CF-332C9F6DCF35}" type="datetimeFigureOut">
               <a:rPr lang="en-US" dirty="0"/>
-              <a:t>10/12/2025</a:t>
+              <a:t>10/13/2025</a:t>
             </a:fld>
             <a:endParaRPr lang="en-US"/>
           </a:p>
@@ -5440,6 +5468,13 @@
             <a:schemeClr val="lt1"/>
           </a:fontRef>
         </p:style>
+        <p:txBody>
+          <a:bodyPr/>
+          <a:lstStyle/>
+          <a:p>
+            <a:endParaRPr lang="cs-CZ"/>
+          </a:p>
+        </p:txBody>
       </p:sp>
       <p:sp>
         <p:nvSpPr>
@@ -5495,6 +5530,13 @@
             <a:schemeClr val="lt1"/>
           </a:fontRef>
         </p:style>
+        <p:txBody>
+          <a:bodyPr/>
+          <a:lstStyle/>
+          <a:p>
+            <a:endParaRPr lang="cs-CZ"/>
+          </a:p>
+        </p:txBody>
       </p:sp>
       <p:sp>
         <p:nvSpPr>
@@ -6120,6 +6162,13 @@
             <a:schemeClr val="lt1"/>
           </a:fontRef>
         </p:style>
+        <p:txBody>
+          <a:bodyPr/>
+          <a:lstStyle/>
+          <a:p>
+            <a:endParaRPr lang="cs-CZ"/>
+          </a:p>
+        </p:txBody>
       </p:sp>
       <p:sp>
         <p:nvSpPr>
@@ -6175,6 +6224,13 @@
             <a:schemeClr val="lt1"/>
           </a:fontRef>
         </p:style>
+        <p:txBody>
+          <a:bodyPr/>
+          <a:lstStyle/>
+          <a:p>
+            <a:endParaRPr lang="cs-CZ"/>
+          </a:p>
+        </p:txBody>
       </p:sp>
       <p:graphicFrame>
         <p:nvGraphicFramePr>
@@ -7646,7 +7702,7 @@
         <p:spPr/>
         <p:txBody>
           <a:bodyPr vert="horz" lIns="0" tIns="45720" rIns="0" bIns="45720" rtlCol="0" anchor="t">
-            <a:normAutofit fontScale="92500" lnSpcReduction="20000"/>
+            <a:normAutofit/>
           </a:bodyPr>
           <a:lstStyle/>
           <a:p>
@@ -7818,42 +7874,7 @@
                 <a:ea typeface="+mn-lt"/>
                 <a:cs typeface="+mn-lt"/>
               </a:rPr>
-              <a:t>Uvádět </a:t>
-            </a:r>
-            <a:r>
-              <a:rPr lang="cs-CZ" b="1" dirty="0">
-                <a:ea typeface="+mn-lt"/>
-                <a:cs typeface="+mn-lt"/>
-              </a:rPr>
-              <a:t>autora, název, rok, vydání, vydavatele, místo vydání, počet stran</a:t>
-            </a:r>
-            <a:endParaRPr lang="cs-CZ" dirty="0"/>
-          </a:p>
-          <a:p>
-            <a:pPr>
-              <a:buFont typeface="Calibri"/>
-              <a:buChar char=" "/>
-            </a:pPr>
-            <a:r>
-              <a:rPr lang="cs-CZ" dirty="0">
-                <a:ea typeface="+mn-lt"/>
-                <a:cs typeface="+mn-lt"/>
-              </a:rPr>
-              <a:t>Přímá citace = uvozovky + odkaz na autora + číslo strany</a:t>
-            </a:r>
-            <a:endParaRPr lang="cs-CZ" dirty="0"/>
-          </a:p>
-          <a:p>
-            <a:pPr>
-              <a:buFont typeface="Calibri"/>
-              <a:buChar char=" "/>
-            </a:pPr>
-            <a:r>
-              <a:rPr lang="cs-CZ" dirty="0">
-                <a:ea typeface="+mn-lt"/>
-                <a:cs typeface="+mn-lt"/>
-              </a:rPr>
-              <a:t>Nepřímá citace = vlastní formulace + odkaz na autora + stránka (pokud je k dispozici)</a:t>
+              <a:t>Rozlišovat mezi přímou a nepřímou citací</a:t>
             </a:r>
             <a:endParaRPr lang="cs-CZ" dirty="0"/>
           </a:p>
@@ -8716,6 +8737,13 @@
             <a:schemeClr val="lt1"/>
           </a:fontRef>
         </p:style>
+        <p:txBody>
+          <a:bodyPr/>
+          <a:lstStyle/>
+          <a:p>
+            <a:endParaRPr lang="cs-CZ"/>
+          </a:p>
+        </p:txBody>
       </p:sp>
       <p:sp>
         <p:nvSpPr>
@@ -8771,6 +8799,13 @@
             <a:schemeClr val="lt1"/>
           </a:fontRef>
         </p:style>
+        <p:txBody>
+          <a:bodyPr/>
+          <a:lstStyle/>
+          <a:p>
+            <a:endParaRPr lang="cs-CZ"/>
+          </a:p>
+        </p:txBody>
       </p:sp>
     </p:spTree>
     <p:extLst>
@@ -9069,6 +9104,21 @@
 </file>
 
 <file path=customXml/item1.xml><?xml version="1.0" encoding="utf-8"?>
+<p:properties xmlns:p="http://schemas.microsoft.com/office/2006/metadata/properties" xmlns:xsi="http://www.w3.org/2001/XMLSchema-instance" xmlns:pc="http://schemas.microsoft.com/office/infopath/2007/PartnerControls">
+  <documentManagement/>
+</p:properties>
+</file>
+
+<file path=customXml/item2.xml><?xml version="1.0" encoding="utf-8"?>
+<?mso-contentType ?>
+<FormTemplates xmlns="http://schemas.microsoft.com/sharepoint/v3/contenttype/forms">
+  <Display>DocumentLibraryForm</Display>
+  <Edit>DocumentLibraryForm</Edit>
+  <New>DocumentLibraryForm</New>
+</FormTemplates>
+</file>
+
+<file path=customXml/item3.xml><?xml version="1.0" encoding="utf-8"?>
 <ct:contentTypeSchema xmlns:ct="http://schemas.microsoft.com/office/2006/metadata/contentType" xmlns:ma="http://schemas.microsoft.com/office/2006/metadata/properties/metaAttributes" ct:_="" ma:_="" ma:contentTypeName="Dokument" ma:contentTypeID="0x01010052F7ECDF1E614946A5A39D5552BFC522" ma:contentTypeVersion="3" ma:contentTypeDescription="Vytvoří nový dokument" ma:contentTypeScope="" ma:versionID="5075b04c696d8e4e1044287e15cbfe0d">
   <xsd:schema xmlns:xsd="http://www.w3.org/2001/XMLSchema" xmlns:xs="http://www.w3.org/2001/XMLSchema" xmlns:p="http://schemas.microsoft.com/office/2006/metadata/properties" xmlns:ns2="09a37b55-a4d7-45bd-a73f-33c2b1d41898" targetNamespace="http://schemas.microsoft.com/office/2006/metadata/properties" ma:root="true" ma:fieldsID="d414fa7318b96dcdb4c31e9e457c351e" ns2:_="">
     <xsd:import namespace="09a37b55-a4d7-45bd-a73f-33c2b1d41898"/>
@@ -9206,22 +9256,24 @@
 </ct:contentTypeSchema>
 </file>
 
-<file path=customXml/item2.xml><?xml version="1.0" encoding="utf-8"?>
-<?mso-contentType ?>
-<FormTemplates xmlns="http://schemas.microsoft.com/sharepoint/v3/contenttype/forms">
-  <Display>DocumentLibraryForm</Display>
-  <Edit>DocumentLibraryForm</Edit>
-  <New>DocumentLibraryForm</New>
-</FormTemplates>
+<file path=customXml/itemProps1.xml><?xml version="1.0" encoding="utf-8"?>
+<ds:datastoreItem xmlns:ds="http://schemas.openxmlformats.org/officeDocument/2006/customXml" ds:itemID="{7CF52871-FF00-4D4A-8396-DA8C6A507140}">
+  <ds:schemaRefs>
+    <ds:schemaRef ds:uri="http://schemas.microsoft.com/office/2006/metadata/properties"/>
+    <ds:schemaRef ds:uri="http://schemas.microsoft.com/office/infopath/2007/PartnerControls"/>
+  </ds:schemaRefs>
+</ds:datastoreItem>
 </file>
 
-<file path=customXml/item3.xml><?xml version="1.0" encoding="utf-8"?>
-<p:properties xmlns:p="http://schemas.microsoft.com/office/2006/metadata/properties" xmlns:xsi="http://www.w3.org/2001/XMLSchema-instance" xmlns:pc="http://schemas.microsoft.com/office/infopath/2007/PartnerControls">
-  <documentManagement/>
-</p:properties>
+<file path=customXml/itemProps2.xml><?xml version="1.0" encoding="utf-8"?>
+<ds:datastoreItem xmlns:ds="http://schemas.openxmlformats.org/officeDocument/2006/customXml" ds:itemID="{3022C7D1-EE9E-4242-B577-CD53C439A66F}">
+  <ds:schemaRefs>
+    <ds:schemaRef ds:uri="http://schemas.microsoft.com/sharepoint/v3/contenttype/forms"/>
+  </ds:schemaRefs>
+</ds:datastoreItem>
 </file>
 
-<file path=customXml/itemProps1.xml><?xml version="1.0" encoding="utf-8"?>
+<file path=customXml/itemProps3.xml><?xml version="1.0" encoding="utf-8"?>
 <ds:datastoreItem xmlns:ds="http://schemas.openxmlformats.org/officeDocument/2006/customXml" ds:itemID="{438BD7EA-DB82-4FBE-B85E-AD10D61ABF31}">
   <ds:schemaRefs>
     <ds:schemaRef ds:uri="09a37b55-a4d7-45bd-a73f-33c2b1d41898"/>
@@ -9237,21 +9289,4 @@
     <ds:schemaRef ds:uri="http://www.w3.org/2001/XMLSchema"/>
   </ds:schemaRefs>
 </ds:datastoreItem>
-</file>
-
-<file path=customXml/itemProps2.xml><?xml version="1.0" encoding="utf-8"?>
-<ds:datastoreItem xmlns:ds="http://schemas.openxmlformats.org/officeDocument/2006/customXml" ds:itemID="{3022C7D1-EE9E-4242-B577-CD53C439A66F}">
-  <ds:schemaRefs>
-    <ds:schemaRef ds:uri="http://schemas.microsoft.com/sharepoint/v3/contenttype/forms"/>
-  </ds:schemaRefs>
-</ds:datastoreItem>
-</file>
-
-<file path=customXml/itemProps3.xml><?xml version="1.0" encoding="utf-8"?>
-<ds:datastoreItem xmlns:ds="http://schemas.openxmlformats.org/officeDocument/2006/customXml" ds:itemID="{7CF52871-FF00-4D4A-8396-DA8C6A507140}">
-  <ds:schemaRefs>
-    <ds:schemaRef ds:uri="http://schemas.microsoft.com/office/2006/metadata/properties"/>
-    <ds:schemaRef ds:uri="http://schemas.microsoft.com/office/infopath/2007/PartnerControls"/>
-  </ds:schemaRefs>
-</ds:datastoreItem>
 </file>
</xml_diff>